<commit_message>
Add twitter page to presentation
</commit_message>
<xml_diff>
--- a/design/presentation/Hang-Out-Kick-Off-Presentation.pptx
+++ b/design/presentation/Hang-Out-Kick-Off-Presentation.pptx
@@ -248,7 +248,7 @@
           <a:p>
             <a:fld id="{A1D2D800-C371-4416-9CDB-477A6A4D73DA}" type="datetimeFigureOut">
               <a:rPr lang="en-US" smtClean="0"/>
-              <a:t>12/11/2014</a:t>
+              <a:t>12/12/2014</a:t>
             </a:fld>
             <a:endParaRPr lang="en-US"/>
           </a:p>
@@ -425,7 +425,7 @@
           <a:p>
             <a:fld id="{A1D2D800-C371-4416-9CDB-477A6A4D73DA}" type="datetimeFigureOut">
               <a:rPr lang="en-US" smtClean="0"/>
-              <a:t>12/11/2014</a:t>
+              <a:t>12/12/2014</a:t>
             </a:fld>
             <a:endParaRPr lang="en-US"/>
           </a:p>
@@ -605,7 +605,7 @@
           <a:p>
             <a:fld id="{A1D2D800-C371-4416-9CDB-477A6A4D73DA}" type="datetimeFigureOut">
               <a:rPr lang="en-US" smtClean="0"/>
-              <a:t>12/11/2014</a:t>
+              <a:t>12/12/2014</a:t>
             </a:fld>
             <a:endParaRPr lang="en-US"/>
           </a:p>
@@ -775,7 +775,7 @@
           <a:p>
             <a:fld id="{A1D2D800-C371-4416-9CDB-477A6A4D73DA}" type="datetimeFigureOut">
               <a:rPr lang="en-US" smtClean="0"/>
-              <a:t>12/11/2014</a:t>
+              <a:t>12/12/2014</a:t>
             </a:fld>
             <a:endParaRPr lang="en-US"/>
           </a:p>
@@ -1021,7 +1021,7 @@
           <a:p>
             <a:fld id="{A1D2D800-C371-4416-9CDB-477A6A4D73DA}" type="datetimeFigureOut">
               <a:rPr lang="en-US" smtClean="0"/>
-              <a:t>12/11/2014</a:t>
+              <a:t>12/12/2014</a:t>
             </a:fld>
             <a:endParaRPr lang="en-US"/>
           </a:p>
@@ -1253,7 +1253,7 @@
           <a:p>
             <a:fld id="{A1D2D800-C371-4416-9CDB-477A6A4D73DA}" type="datetimeFigureOut">
               <a:rPr lang="en-US" smtClean="0"/>
-              <a:t>12/11/2014</a:t>
+              <a:t>12/12/2014</a:t>
             </a:fld>
             <a:endParaRPr lang="en-US"/>
           </a:p>
@@ -1620,7 +1620,7 @@
           <a:p>
             <a:fld id="{A1D2D800-C371-4416-9CDB-477A6A4D73DA}" type="datetimeFigureOut">
               <a:rPr lang="en-US" smtClean="0"/>
-              <a:t>12/11/2014</a:t>
+              <a:t>12/12/2014</a:t>
             </a:fld>
             <a:endParaRPr lang="en-US"/>
           </a:p>
@@ -1738,7 +1738,7 @@
           <a:p>
             <a:fld id="{A1D2D800-C371-4416-9CDB-477A6A4D73DA}" type="datetimeFigureOut">
               <a:rPr lang="en-US" smtClean="0"/>
-              <a:t>12/11/2014</a:t>
+              <a:t>12/12/2014</a:t>
             </a:fld>
             <a:endParaRPr lang="en-US"/>
           </a:p>
@@ -1833,7 +1833,7 @@
           <a:p>
             <a:fld id="{A1D2D800-C371-4416-9CDB-477A6A4D73DA}" type="datetimeFigureOut">
               <a:rPr lang="en-US" smtClean="0"/>
-              <a:t>12/11/2014</a:t>
+              <a:t>12/12/2014</a:t>
             </a:fld>
             <a:endParaRPr lang="en-US"/>
           </a:p>
@@ -2110,7 +2110,7 @@
           <a:p>
             <a:fld id="{A1D2D800-C371-4416-9CDB-477A6A4D73DA}" type="datetimeFigureOut">
               <a:rPr lang="en-US" smtClean="0"/>
-              <a:t>12/11/2014</a:t>
+              <a:t>12/12/2014</a:t>
             </a:fld>
             <a:endParaRPr lang="en-US"/>
           </a:p>
@@ -2363,7 +2363,7 @@
           <a:p>
             <a:fld id="{A1D2D800-C371-4416-9CDB-477A6A4D73DA}" type="datetimeFigureOut">
               <a:rPr lang="en-US" smtClean="0"/>
-              <a:t>12/11/2014</a:t>
+              <a:t>12/12/2014</a:t>
             </a:fld>
             <a:endParaRPr lang="en-US"/>
           </a:p>
@@ -2596,7 +2596,7 @@
           <a:p>
             <a:fld id="{A1D2D800-C371-4416-9CDB-477A6A4D73DA}" type="datetimeFigureOut">
               <a:rPr lang="en-US" smtClean="0"/>
-              <a:t>12/11/2014</a:t>
+              <a:t>12/12/2014</a:t>
             </a:fld>
             <a:endParaRPr lang="en-US"/>
           </a:p>
@@ -3667,7 +3667,7 @@
         <p:spPr/>
         <p:txBody>
           <a:bodyPr>
-            <a:normAutofit/>
+            <a:normAutofit lnSpcReduction="10000"/>
           </a:bodyPr>
           <a:lstStyle/>
           <a:p>
@@ -3693,9 +3693,16 @@
               <a:t>https://</a:t>
             </a:r>
             <a:r>
+              <a:rPr lang="ro-RO" dirty="0" smtClean="0"/>
+              <a:t>facebook.com/hangoutlikenothing</a:t>
+            </a:r>
+          </a:p>
+          <a:p>
+            <a:r>
               <a:rPr lang="ro-RO" dirty="0"/>
-              <a:t>facebook.com/hangoutlikenothing</a:t>
-            </a:r>
+              <a:t>https://twitter.com/hangoutwithus</a:t>
+            </a:r>
+            <a:endParaRPr lang="ro-RO" dirty="0"/>
           </a:p>
           <a:p>
             <a:endParaRPr lang="ro-RO" dirty="0" smtClean="0"/>

</xml_diff>